<commit_message>
doc: Enhance presentation parts with Mermaid diagrams and tables
Apply visual enhancements to presentation markdown files:
- Part 1 Journey: Minor formatting improvements
- Part 3 Technical Findings: Add Mermaid diagrams for architecture, debt, infrastructure, performance, cost
- Part 5 Vendor Lock-in: Add Mermaid diagrams and tables for lock-in analysis
- Update Part 5 PowerPoint with aligned visuals

All enhancements preserve original ASCII diagrams in speaker notes and maintain
all references and citations. Markdown linting verified for all files.
</commit_message>
<xml_diff>
--- a/docs/deliverables/first-restitution-2025-11-24/powerpoint/part5-vendor-lock-in.pptx
+++ b/docs/deliverables/first-restitution-2025-11-24/powerpoint/part5-vendor-lock-in.pptx
@@ -506,6 +506,120 @@
           <a:lstStyle/>
           <a:p>
             <a:r>
+              <a:t>DIAGRAM:</a:t>
+            </a:r>
+          </a:p>
+          <a:p>
+            <a:r>
+              <a:t>Vendor Lock-in Assessment</a:t>
+            </a:r>
+          </a:p>
+          <a:p/>
+          <a:p>
+            <a:r>
+              <a:t>1. Matching Engine                    2. Infrastructure-as-Code</a:t>
+            </a:r>
+          </a:p>
+          <a:p>
+            <a:r>
+              <a:t>   (Contractual + Conceptual)            (Proprietary Library)</a:t>
+            </a:r>
+          </a:p>
+          <a:p/>
+          <a:p>
+            <a:r>
+              <a:t>   🔴 Source code: Contract              🔴 IaC templates: Not included</a:t>
+            </a:r>
+          </a:p>
+          <a:p>
+            <a:r>
+              <a:t>      termination only                      in source delivery</a:t>
+            </a:r>
+          </a:p>
+          <a:p/>
+          <a:p>
+            <a:r>
+              <a:t>   ✅ Physical separation: REST API      🔴 Smart AIM library: Proprietary</a:t>
+            </a:r>
+          </a:p>
+          <a:p>
+            <a:r>
+              <a:t>      integration (good architecture)</a:t>
+            </a:r>
+          </a:p>
+          <a:p/>
+          <a:p>
+            <a:r>
+              <a:t>   ⚠️  "Heart of the product" (Yann)    ⚠️  Options: Rebuild (1-2 months)</a:t>
+            </a:r>
+          </a:p>
+          <a:p>
+            <a:r>
+              <a:t>                                           or License Smart AIM</a:t>
+            </a:r>
+          </a:p>
+          <a:p/>
+          <a:p>
+            <a:r>
+              <a:t>   Impact: Alternative matching          Impact: Environment replication</a:t>
+            </a:r>
+          </a:p>
+          <a:p>
+            <a:r>
+              <a:t>   engines unknown, refactoring             impossible without rebuild</a:t>
+            </a:r>
+          </a:p>
+          <a:p>
+            <a:r>
+              <a:t>   required                                 or licensing</a:t>
+            </a:r>
+          </a:p>
+          <a:p/>
+          <a:p>
+            <a:r>
+              <a:t>3. Knowledge Transfer</a:t>
+            </a:r>
+          </a:p>
+          <a:p>
+            <a:r>
+              <a:t>   (Implicit Knowledge)</a:t>
+            </a:r>
+          </a:p>
+          <a:p/>
+          <a:p>
+            <a:r>
+              <a:t>   ⚠️  Minimal code comments</a:t>
+            </a:r>
+          </a:p>
+          <a:p>
+            <a:r>
+              <a:t>   🔴 No onboarding process</a:t>
+            </a:r>
+          </a:p>
+          <a:p>
+            <a:r>
+              <a:t>   ⚠️  Significant duplication</a:t>
+            </a:r>
+          </a:p>
+          <a:p>
+            <a:r>
+              <a:t>   ⚠️  "Tentacular" dependencies</a:t>
+            </a:r>
+          </a:p>
+          <a:p/>
+          <a:p>
+            <a:r>
+              <a:t>   Impact: Vendor switch viability</a:t>
+            </a:r>
+          </a:p>
+          <a:p>
+            <a:r>
+              <a:t>   UNKNOWN (highest risk)</a:t>
+            </a:r>
+          </a:p>
+          <a:p/>
+          <a:p>
+            <a:r>
               <a:t>Vendor lock-in has three distinct mechanisms. Let's examine each.</a:t>
             </a:r>
           </a:p>
@@ -739,6 +853,134 @@
           <a:lstStyle/>
           <a:p>
             <a:r>
+              <a:t>DIAGRAM:</a:t>
+            </a:r>
+          </a:p>
+          <a:p>
+            <a:r>
+              <a:t>Matching Engine Integration Architecture</a:t>
+            </a:r>
+          </a:p>
+          <a:p/>
+          <a:p>
+            <a:r>
+              <a:t>ISWC Application                    Matching Engine (Spanish Point)</a:t>
+            </a:r>
+          </a:p>
+          <a:p>
+            <a:r>
+              <a:t>┌────────────────────┐             ┌──────────────────────────────┐</a:t>
+            </a:r>
+          </a:p>
+          <a:p>
+            <a:r>
+              <a:t>│  Validation        │             │  Matching Engine API         │</a:t>
+            </a:r>
+          </a:p>
+          <a:p>
+            <a:r>
+              <a:t>│  Pipeline          │    REST     │  (Deployed separately)       │</a:t>
+            </a:r>
+          </a:p>
+          <a:p>
+            <a:r>
+              <a:t>│                    │◀───HTTP────▶│                              │</a:t>
+            </a:r>
+          </a:p>
+          <a:p>
+            <a:r>
+              <a:t>│  ┌──────────────┐  │             │  ┌────────────────────────┐  │</a:t>
+            </a:r>
+          </a:p>
+          <a:p>
+            <a:r>
+              <a:t>│  │IMatchingEngine│  │             │  │ Proprietary Matching   │  │</a:t>
+            </a:r>
+          </a:p>
+          <a:p>
+            <a:r>
+              <a:t>│  │MatchingService│  │             │  │ Algorithm              │  │</a:t>
+            </a:r>
+          </a:p>
+          <a:p>
+            <a:r>
+              <a:t>│  │  (Interface)  │  │             │  │                        │  │</a:t>
+            </a:r>
+          </a:p>
+          <a:p>
+            <a:r>
+              <a:t>│  └──────────────┘  │             │  │ Source Code:           │  │</a:t>
+            </a:r>
+          </a:p>
+          <a:p>
+            <a:r>
+              <a:t>│         ▲          │             │  │ Contract termination   │  │</a:t>
+            </a:r>
+          </a:p>
+          <a:p>
+            <a:r>
+              <a:t>│         │          │             │  │ only                   │  │</a:t>
+            </a:r>
+          </a:p>
+          <a:p>
+            <a:r>
+              <a:t>│  ┌──────────────┐  │             │  └────────────────────────┘  │</a:t>
+            </a:r>
+          </a:p>
+          <a:p>
+            <a:r>
+              <a:t>│  │MatchingEngine│  │   OAuth2    │                              │</a:t>
+            </a:r>
+          </a:p>
+          <a:p>
+            <a:r>
+              <a:t>│  │MatchingService│──┼────Auth────▶│  Authentication              │</a:t>
+            </a:r>
+          </a:p>
+          <a:p>
+            <a:r>
+              <a:t>│  │    (.cs)      │  │             │                              │</a:t>
+            </a:r>
+          </a:p>
+          <a:p>
+            <a:r>
+              <a:t>│  └──────────────┘  │             │  REST Endpoints:             │</a:t>
+            </a:r>
+          </a:p>
+          <a:p>
+            <a:r>
+              <a:t>│                    │             │  • POST /match               │</a:t>
+            </a:r>
+          </a:p>
+          <a:p>
+            <a:r>
+              <a:t>│                    │             │  • GET /results              │</a:t>
+            </a:r>
+          </a:p>
+          <a:p>
+            <a:r>
+              <a:t>└────────────────────┘             └──────────────────────────────┘</a:t>
+            </a:r>
+          </a:p>
+          <a:p/>
+          <a:p>
+            <a:r>
+              <a:t>✅ POSITIVE: Clean architectural separation (physically separated)</a:t>
+            </a:r>
+          </a:p>
+          <a:p>
+            <a:r>
+              <a:t>⚠️  CONCERN: Synchronous blocking calls (performance coupling)</a:t>
+            </a:r>
+          </a:p>
+          <a:p>
+            <a:r>
+              <a:t>🔴 BLOCKER: Contractual restriction (source code inaccessible)</a:t>
+            </a:r>
+          </a:p>
+          <a:p/>
+          <a:p>
+            <a:r>
               <a:t>The Matching Engine deserves special attention - it's both the cleanest technical integration AND the strongest lock-in.</a:t>
             </a:r>
           </a:p>
@@ -939,6 +1181,125 @@
           <a:lstStyle/>
           <a:p>
             <a:r>
+              <a:t>DIAGRAM:</a:t>
+            </a:r>
+          </a:p>
+          <a:p>
+            <a:r>
+              <a:t>Access Status Matrix (as of Nov 24, 2025)</a:t>
+            </a:r>
+          </a:p>
+          <a:p/>
+          <a:p>
+            <a:r>
+              <a:t>Resource                           Status      Impact on Vendor Independence</a:t>
+            </a:r>
+          </a:p>
+          <a:p/>
+          <a:p>
+            <a:r>
+              <a:t>✅ ISWC Application Source Code     GRANTED    Can analyze architecture,</a:t>
+            </a:r>
+          </a:p>
+          <a:p>
+            <a:r>
+              <a:t>   (.NET 8)                                    code quality, integration</a:t>
+            </a:r>
+          </a:p>
+          <a:p>
+            <a:r>
+              <a:t>                                               patterns</a:t>
+            </a:r>
+          </a:p>
+          <a:p/>
+          <a:p>
+            <a:r>
+              <a:t>⚠️  Git Commit History              PENDING    Cannot analyze evolution,</a:t>
+            </a:r>
+          </a:p>
+          <a:p>
+            <a:r>
+              <a:t>                                    (3+ weeks)  developer turnover, knowledge</a:t>
+            </a:r>
+          </a:p>
+          <a:p>
+            <a:r>
+              <a:t>                                               concentration (bus factor)</a:t>
+            </a:r>
+          </a:p>
+          <a:p/>
+          <a:p>
+            <a:r>
+              <a:t>🔴 Matching Engine Source Code      BLOCKED    Cannot assess replacement</a:t>
+            </a:r>
+          </a:p>
+          <a:p>
+            <a:r>
+              <a:t>                                    (Contract)  feasibility, build alternative,</a:t>
+            </a:r>
+          </a:p>
+          <a:p>
+            <a:r>
+              <a:t>                                               or evaluate IP constraints</a:t>
+            </a:r>
+          </a:p>
+          <a:p/>
+          <a:p>
+            <a:r>
+              <a:t>🔴 IaC Templates &amp; CI/CD Pipeline   EXCLUDED   Cannot reproduce environments,</a:t>
+            </a:r>
+          </a:p>
+          <a:p>
+            <a:r>
+              <a:t>                                    (Proprietary) understand deployment process,</a:t>
+            </a:r>
+          </a:p>
+          <a:p>
+            <a:r>
+              <a:t>                                               or enable new vendor</a:t>
+            </a:r>
+          </a:p>
+          <a:p/>
+          <a:p>
+            <a:r>
+              <a:t>🟡 Azure DevOps Board (Task Mgmt)   PENDING    Cannot assess velocity,</a:t>
+            </a:r>
+          </a:p>
+          <a:p>
+            <a:r>
+              <a:t>                                    (CISAC auth) sprint planning, agile</a:t>
+            </a:r>
+          </a:p>
+          <a:p>
+            <a:r>
+              <a:t>                                               maturity</a:t>
+            </a:r>
+          </a:p>
+          <a:p/>
+          <a:p>
+            <a:r>
+              <a:t>🟡 Production Performance Metrics   LIMITED    Relies on Spanish Point claims</a:t>
+            </a:r>
+          </a:p>
+          <a:p>
+            <a:r>
+              <a:t>                                               rather than shared dashboards</a:t>
+            </a:r>
+          </a:p>
+          <a:p/>
+          <a:p>
+            <a:r>
+              <a:t>🟡 Cost Correlation Data            MANUAL     No automated tooling,</a:t>
+            </a:r>
+          </a:p>
+          <a:p>
+            <a:r>
+              <a:t>                                               support ticket required</a:t>
+            </a:r>
+          </a:p>
+          <a:p/>
+          <a:p>
+            <a:r>
               <a:t>Let's summarize what we could and couldn't access during this audit, and why it matters.</a:t>
             </a:r>
           </a:p>
@@ -1178,6 +1539,109 @@
         <p:txBody>
           <a:bodyPr/>
           <a:lstStyle/>
+          <a:p>
+            <a:r>
+              <a:t>DIAGRAM:</a:t>
+            </a:r>
+          </a:p>
+          <a:p>
+            <a:r>
+              <a:t>Vendor Switch Effort Estimate (Preliminary, LOW Confidence)</a:t>
+            </a:r>
+          </a:p>
+          <a:p/>
+          <a:p>
+            <a:r>
+              <a:t>Component                    Effort Estimate    Dependencies &amp; Risks</a:t>
+            </a:r>
+          </a:p>
+          <a:p/>
+          <a:p>
+            <a:r>
+              <a:t>Application Code Handover    3-6 months        • Knowledge transfer viability UNKNOWN</a:t>
+            </a:r>
+          </a:p>
+          <a:p>
+            <a:r>
+              <a:t>                                              • Minimal documentation</a:t>
+            </a:r>
+          </a:p>
+          <a:p>
+            <a:r>
+              <a:t>                                              • No onboarding process</a:t>
+            </a:r>
+          </a:p>
+          <a:p>
+            <a:r>
+              <a:t>                                              • Recommend: Pilot test first</a:t>
+            </a:r>
+          </a:p>
+          <a:p/>
+          <a:p>
+            <a:r>
+              <a:t>IaC Reconstruction          1-2 months        • 343 Azure resources</a:t>
+            </a:r>
+          </a:p>
+          <a:p>
+            <a:r>
+              <a:t>                                              • Reverse-engineer from portal</a:t>
+            </a:r>
+          </a:p>
+          <a:p>
+            <a:r>
+              <a:t>                                              • OR license Smart AIM library (cost unknown)</a:t>
+            </a:r>
+          </a:p>
+          <a:p/>
+          <a:p>
+            <a:r>
+              <a:t>Matching Engine             6-12 months       • Alternative vendors UNKNOWN</a:t>
+            </a:r>
+          </a:p>
+          <a:p>
+            <a:r>
+              <a:t>Replacement                 (if required)     • Substantial refactoring likely</a:t>
+            </a:r>
+          </a:p>
+          <a:p>
+            <a:r>
+              <a:t>                                              • OR accept ongoing lock-in</a:t>
+            </a:r>
+          </a:p>
+          <a:p/>
+          <a:p>
+            <a:r>
+              <a:t>Knowledge Transfer          6-12 months       • Parallel vendor overlap recommended</a:t>
+            </a:r>
+          </a:p>
+          <a:p>
+            <a:r>
+              <a:t> (Overlap Period)           (parallel run)    • Gradual transition reduces risk</a:t>
+            </a:r>
+          </a:p>
+          <a:p/>
+          <a:p>
+            <a:r>
+              <a:t>───────────────────────────────────────────────────────────────────────────</a:t>
+            </a:r>
+          </a:p>
+          <a:p>
+            <a:r>
+              <a:t>TOTAL TIMELINE              12-24 months      HIGH uncertainty due to unknowns</a:t>
+            </a:r>
+          </a:p>
+          <a:p/>
+          <a:p>
+            <a:r>
+              <a:t>ESTIMATED COST              €300K - €600K     VERY LOW confidence</a:t>
+            </a:r>
+          </a:p>
+          <a:p>
+            <a:r>
+              <a:t>                                              (educated guess, not scoped)</a:t>
+            </a:r>
+          </a:p>
+          <a:p/>
           <a:p>
             <a:r>
               <a:t>Let's talk about what it would actually take to switch vendors.</a:t>
@@ -4494,6 +4958,41 @@
           </a:p>
         </p:txBody>
       </p:sp>
+      <p:sp>
+        <p:nvSpPr>
+          <p:cNvPr id="3" name="TextBox 2"/>
+          <p:cNvSpPr txBox="1"/>
+          <p:nvPr/>
+        </p:nvSpPr>
+        <p:spPr>
+          <a:xfrm>
+            <a:off x="914400" y="3657600"/>
+            <a:ext cx="10362895" cy="914400"/>
+          </a:xfrm>
+          <a:prstGeom prst="rect">
+            <a:avLst/>
+          </a:prstGeom>
+          <a:noFill/>
+        </p:spPr>
+        <p:txBody>
+          <a:bodyPr wrap="none">
+            <a:spAutoFit/>
+          </a:bodyPr>
+          <a:lstStyle/>
+          <a:p>
+            <a:pPr algn="ctr">
+              <a:defRPr sz="2400">
+                <a:solidFill>
+                  <a:srgbClr val="505050"/>
+                </a:solidFill>
+              </a:defRPr>
+            </a:pPr>
+            <a:r>
+              <a:t>7 minutes, Slides 18-21</a:t>
+            </a:r>
+          </a:p>
+        </p:txBody>
+      </p:sp>
     </p:spTree>
   </p:cSld>
   <p:clrMapOvr>
@@ -4535,14 +5034,14 @@
           <a:lstStyle/>
           <a:p>
             <a:pPr>
-              <a:defRPr sz="3600" b="1">
+              <a:defRPr sz="3200" b="1">
                 <a:solidFill>
                   <a:srgbClr val="4169E1"/>
                 </a:solidFill>
               </a:defRPr>
             </a:pPr>
             <a:r>
-              <a:t>Slide  Three Lock-in Mechanisms</a:t>
+              <a:t>18: Three Lock</a:t>
             </a:r>
           </a:p>
         </p:txBody>
@@ -4556,7 +5055,7 @@
         <p:spPr>
           <a:xfrm>
             <a:off x="457200" y="1005840"/>
-            <a:ext cx="11277295" cy="5486400"/>
+            <a:ext cx="11277295" cy="5394960"/>
           </a:xfrm>
           <a:prstGeom prst="rect">
             <a:avLst/>
@@ -4570,9 +5069,9 @@
           <a:lstStyle/>
           <a:p>
             <a:pPr>
-              <a:defRPr sz="1800" b="1">
-                <a:solidFill>
-                  <a:srgbClr val="000000"/>
+              <a:defRPr sz="1100" b="0">
+                <a:solidFill>
+                  <a:srgbClr val="505050"/>
                 </a:solidFill>
               </a:defRPr>
             </a:pPr>
@@ -4582,18 +5081,18 @@
           </a:p>
           <a:p>
             <a:pPr>
-              <a:defRPr sz="1400">
-                <a:solidFill>
-                  <a:srgbClr val="000000"/>
-                </a:solidFill>
-              </a:defRPr>
-            </a:pPr>
-          </a:p>
-          <a:p>
-            <a:pPr>
-              <a:defRPr sz="1400">
-                <a:solidFill>
-                  <a:srgbClr val="000000"/>
+              <a:defRPr sz="1100" b="0">
+                <a:solidFill>
+                  <a:srgbClr val="505050"/>
+                </a:solidFill>
+              </a:defRPr>
+            </a:pPr>
+          </a:p>
+          <a:p>
+            <a:pPr>
+              <a:defRPr sz="1100" b="0">
+                <a:solidFill>
+                  <a:srgbClr val="505050"/>
                 </a:solidFill>
               </a:defRPr>
             </a:pPr>
@@ -4603,174 +5102,174 @@
           </a:p>
           <a:p>
             <a:pPr>
-              <a:defRPr sz="1400">
-                <a:solidFill>
-                  <a:srgbClr val="000000"/>
-                </a:solidFill>
-              </a:defRPr>
-            </a:pPr>
-            <a:r>
-              <a:t>(Contractual + Conceptual)            (Proprietary Library)</a:t>
-            </a:r>
-          </a:p>
-          <a:p>
-            <a:pPr>
-              <a:defRPr sz="1400">
-                <a:solidFill>
-                  <a:srgbClr val="000000"/>
-                </a:solidFill>
-              </a:defRPr>
-            </a:pPr>
-          </a:p>
-          <a:p>
-            <a:pPr>
-              <a:defRPr sz="1600">
-                <a:solidFill>
-                  <a:srgbClr val="DC143C"/>
-                </a:solidFill>
-              </a:defRPr>
-            </a:pPr>
-            <a:r>
-              <a:t>🔴 Source code: Contract              🔴 IaC templates: Not included</a:t>
-            </a:r>
-          </a:p>
-          <a:p>
-            <a:pPr>
-              <a:defRPr sz="1400">
-                <a:solidFill>
-                  <a:srgbClr val="000000"/>
-                </a:solidFill>
-              </a:defRPr>
-            </a:pPr>
-            <a:r>
-              <a:t>termination only                      in source delivery</a:t>
-            </a:r>
-          </a:p>
-          <a:p>
-            <a:pPr>
-              <a:defRPr sz="1400">
-                <a:solidFill>
-                  <a:srgbClr val="000000"/>
-                </a:solidFill>
-              </a:defRPr>
-            </a:pPr>
-          </a:p>
-          <a:p>
-            <a:pPr>
-              <a:defRPr sz="1600">
-                <a:solidFill>
-                  <a:srgbClr val="228B22"/>
-                </a:solidFill>
-              </a:defRPr>
-            </a:pPr>
-            <a:r>
-              <a:t>✅ Physical separation: REST API      🔴 Smart AIM library: Proprietary</a:t>
-            </a:r>
-          </a:p>
-          <a:p>
-            <a:pPr>
-              <a:defRPr sz="1400">
-                <a:solidFill>
-                  <a:srgbClr val="000000"/>
-                </a:solidFill>
-              </a:defRPr>
-            </a:pPr>
-            <a:r>
-              <a:t>integration (good architecture)</a:t>
-            </a:r>
-          </a:p>
-          <a:p>
-            <a:pPr>
-              <a:defRPr sz="1400">
-                <a:solidFill>
-                  <a:srgbClr val="000000"/>
-                </a:solidFill>
-              </a:defRPr>
-            </a:pPr>
-          </a:p>
-          <a:p>
-            <a:pPr>
-              <a:defRPr sz="1600">
-                <a:solidFill>
-                  <a:srgbClr val="FF8C00"/>
-                </a:solidFill>
-              </a:defRPr>
-            </a:pPr>
-            <a:r>
-              <a:t>⚠️  "Heart of the product" (Yann)    ⚠️  Options: Rebuild (1-2 months)</a:t>
-            </a:r>
-          </a:p>
-          <a:p>
-            <a:pPr>
-              <a:defRPr sz="1400">
-                <a:solidFill>
-                  <a:srgbClr val="000000"/>
-                </a:solidFill>
-              </a:defRPr>
-            </a:pPr>
-            <a:r>
-              <a:t>or License Smart AIM</a:t>
-            </a:r>
-          </a:p>
-          <a:p>
-            <a:pPr>
-              <a:defRPr sz="1400">
-                <a:solidFill>
-                  <a:srgbClr val="000000"/>
-                </a:solidFill>
-              </a:defRPr>
-            </a:pPr>
-          </a:p>
-          <a:p>
-            <a:pPr>
-              <a:defRPr sz="1400">
-                <a:solidFill>
-                  <a:srgbClr val="000000"/>
-                </a:solidFill>
-              </a:defRPr>
-            </a:pPr>
-            <a:r>
-              <a:t>Impact: Alternative matching          Impact: Environment replication</a:t>
-            </a:r>
-          </a:p>
-          <a:p>
-            <a:pPr>
-              <a:defRPr sz="1400">
-                <a:solidFill>
-                  <a:srgbClr val="000000"/>
-                </a:solidFill>
-              </a:defRPr>
-            </a:pPr>
-            <a:r>
-              <a:t>engines unknown, refactoring             impossible without rebuild</a:t>
-            </a:r>
-          </a:p>
-          <a:p>
-            <a:pPr>
-              <a:defRPr sz="1400">
-                <a:solidFill>
-                  <a:srgbClr val="000000"/>
-                </a:solidFill>
-              </a:defRPr>
-            </a:pPr>
-            <a:r>
-              <a:t>required                                 or licensing</a:t>
-            </a:r>
-          </a:p>
-          <a:p>
-            <a:pPr>
-              <a:defRPr sz="1400">
-                <a:solidFill>
-                  <a:srgbClr val="000000"/>
-                </a:solidFill>
-              </a:defRPr>
-            </a:pPr>
-          </a:p>
-          <a:p>
-            <a:pPr>
-              <a:defRPr sz="1400">
-                <a:solidFill>
-                  <a:srgbClr val="000000"/>
+              <a:defRPr sz="1100" b="0">
+                <a:solidFill>
+                  <a:srgbClr val="505050"/>
+                </a:solidFill>
+              </a:defRPr>
+            </a:pPr>
+            <a:r>
+              <a:t>   (Contractual + Conceptual)            (Proprietary Library)</a:t>
+            </a:r>
+          </a:p>
+          <a:p>
+            <a:pPr>
+              <a:defRPr sz="1100" b="0">
+                <a:solidFill>
+                  <a:srgbClr val="505050"/>
+                </a:solidFill>
+              </a:defRPr>
+            </a:pPr>
+          </a:p>
+          <a:p>
+            <a:pPr>
+              <a:defRPr sz="1100" b="0">
+                <a:solidFill>
+                  <a:srgbClr val="505050"/>
+                </a:solidFill>
+              </a:defRPr>
+            </a:pPr>
+            <a:r>
+              <a:t>   🔴 Source code: Contract              🔴 IaC templates: Not included</a:t>
+            </a:r>
+          </a:p>
+          <a:p>
+            <a:pPr>
+              <a:defRPr sz="1100" b="0">
+                <a:solidFill>
+                  <a:srgbClr val="505050"/>
+                </a:solidFill>
+              </a:defRPr>
+            </a:pPr>
+            <a:r>
+              <a:t>      termination only                      in source delivery</a:t>
+            </a:r>
+          </a:p>
+          <a:p>
+            <a:pPr>
+              <a:defRPr sz="1100" b="0">
+                <a:solidFill>
+                  <a:srgbClr val="505050"/>
+                </a:solidFill>
+              </a:defRPr>
+            </a:pPr>
+          </a:p>
+          <a:p>
+            <a:pPr>
+              <a:defRPr sz="1100" b="0">
+                <a:solidFill>
+                  <a:srgbClr val="505050"/>
+                </a:solidFill>
+              </a:defRPr>
+            </a:pPr>
+            <a:r>
+              <a:t>   ✅ Physical separation: REST API      🔴 Smart AIM library: Proprietary</a:t>
+            </a:r>
+          </a:p>
+          <a:p>
+            <a:pPr>
+              <a:defRPr sz="1100" b="0">
+                <a:solidFill>
+                  <a:srgbClr val="505050"/>
+                </a:solidFill>
+              </a:defRPr>
+            </a:pPr>
+            <a:r>
+              <a:t>      integration (good architecture)</a:t>
+            </a:r>
+          </a:p>
+          <a:p>
+            <a:pPr>
+              <a:defRPr sz="1100" b="0">
+                <a:solidFill>
+                  <a:srgbClr val="505050"/>
+                </a:solidFill>
+              </a:defRPr>
+            </a:pPr>
+          </a:p>
+          <a:p>
+            <a:pPr>
+              <a:defRPr sz="1100" b="0">
+                <a:solidFill>
+                  <a:srgbClr val="505050"/>
+                </a:solidFill>
+              </a:defRPr>
+            </a:pPr>
+            <a:r>
+              <a:t>   ⚠️  "Heart of the product" (Yann)    ⚠️  Options: Rebuild (1-2 months)</a:t>
+            </a:r>
+          </a:p>
+          <a:p>
+            <a:pPr>
+              <a:defRPr sz="1100" b="0">
+                <a:solidFill>
+                  <a:srgbClr val="505050"/>
+                </a:solidFill>
+              </a:defRPr>
+            </a:pPr>
+            <a:r>
+              <a:t>                                           or License Smart AIM</a:t>
+            </a:r>
+          </a:p>
+          <a:p>
+            <a:pPr>
+              <a:defRPr sz="1100" b="0">
+                <a:solidFill>
+                  <a:srgbClr val="505050"/>
+                </a:solidFill>
+              </a:defRPr>
+            </a:pPr>
+          </a:p>
+          <a:p>
+            <a:pPr>
+              <a:defRPr sz="1100" b="0">
+                <a:solidFill>
+                  <a:srgbClr val="505050"/>
+                </a:solidFill>
+              </a:defRPr>
+            </a:pPr>
+            <a:r>
+              <a:t>   Impact: Alternative matching          Impact: Environment replication</a:t>
+            </a:r>
+          </a:p>
+          <a:p>
+            <a:pPr>
+              <a:defRPr sz="1100" b="0">
+                <a:solidFill>
+                  <a:srgbClr val="505050"/>
+                </a:solidFill>
+              </a:defRPr>
+            </a:pPr>
+            <a:r>
+              <a:t>   engines unknown, refactoring             impossible without rebuild</a:t>
+            </a:r>
+          </a:p>
+          <a:p>
+            <a:pPr>
+              <a:defRPr sz="1100" b="0">
+                <a:solidFill>
+                  <a:srgbClr val="505050"/>
+                </a:solidFill>
+              </a:defRPr>
+            </a:pPr>
+            <a:r>
+              <a:t>   required                                 or licensing</a:t>
+            </a:r>
+          </a:p>
+          <a:p>
+            <a:pPr>
+              <a:defRPr sz="1100" b="0">
+                <a:solidFill>
+                  <a:srgbClr val="505050"/>
+                </a:solidFill>
+              </a:defRPr>
+            </a:pPr>
+          </a:p>
+          <a:p>
+            <a:pPr>
+              <a:defRPr sz="1100" b="0">
+                <a:solidFill>
+                  <a:srgbClr val="505050"/>
                 </a:solidFill>
               </a:defRPr>
             </a:pPr>
@@ -4780,104 +5279,71 @@
           </a:p>
           <a:p>
             <a:pPr>
-              <a:defRPr sz="1400">
-                <a:solidFill>
-                  <a:srgbClr val="000000"/>
-                </a:solidFill>
-              </a:defRPr>
-            </a:pPr>
-            <a:r>
-              <a:t>(Implicit Knowledge)</a:t>
-            </a:r>
-          </a:p>
-          <a:p>
-            <a:pPr>
-              <a:defRPr sz="1400">
-                <a:solidFill>
-                  <a:srgbClr val="000000"/>
-                </a:solidFill>
-              </a:defRPr>
-            </a:pPr>
-          </a:p>
-          <a:p>
-            <a:pPr>
-              <a:defRPr sz="1600">
-                <a:solidFill>
-                  <a:srgbClr val="FF8C00"/>
-                </a:solidFill>
-              </a:defRPr>
-            </a:pPr>
-            <a:r>
-              <a:t>⚠️  Minimal code comments</a:t>
-            </a:r>
-          </a:p>
-          <a:p>
-            <a:pPr>
-              <a:defRPr sz="1600">
-                <a:solidFill>
-                  <a:srgbClr val="DC143C"/>
-                </a:solidFill>
-              </a:defRPr>
-            </a:pPr>
-            <a:r>
-              <a:t>🔴 No onboarding process</a:t>
-            </a:r>
-          </a:p>
-          <a:p>
-            <a:pPr>
-              <a:defRPr sz="1600">
-                <a:solidFill>
-                  <a:srgbClr val="FF8C00"/>
-                </a:solidFill>
-              </a:defRPr>
-            </a:pPr>
-            <a:r>
-              <a:t>⚠️  Significant duplication</a:t>
-            </a:r>
-          </a:p>
-          <a:p>
-            <a:pPr>
-              <a:defRPr sz="1600">
-                <a:solidFill>
-                  <a:srgbClr val="FF8C00"/>
-                </a:solidFill>
-              </a:defRPr>
-            </a:pPr>
-            <a:r>
-              <a:t>⚠️  "Tentacular" dependencies</a:t>
-            </a:r>
-          </a:p>
-          <a:p>
-            <a:pPr>
-              <a:defRPr sz="1400">
-                <a:solidFill>
-                  <a:srgbClr val="000000"/>
-                </a:solidFill>
-              </a:defRPr>
-            </a:pPr>
-          </a:p>
-          <a:p>
-            <a:pPr>
-              <a:defRPr sz="1400">
-                <a:solidFill>
-                  <a:srgbClr val="000000"/>
-                </a:solidFill>
-              </a:defRPr>
-            </a:pPr>
-            <a:r>
-              <a:t>Impact: Vendor switch viability</a:t>
-            </a:r>
-          </a:p>
-          <a:p>
-            <a:pPr>
-              <a:defRPr sz="1400">
-                <a:solidFill>
-                  <a:srgbClr val="000000"/>
-                </a:solidFill>
-              </a:defRPr>
-            </a:pPr>
-            <a:r>
-              <a:t>UNKNOWN (highest risk)</a:t>
+              <a:defRPr sz="1100" b="0">
+                <a:solidFill>
+                  <a:srgbClr val="505050"/>
+                </a:solidFill>
+              </a:defRPr>
+            </a:pPr>
+            <a:r>
+              <a:t>   (Implicit Knowledge)</a:t>
+            </a:r>
+          </a:p>
+          <a:p>
+            <a:pPr>
+              <a:defRPr sz="1100" b="0">
+                <a:solidFill>
+                  <a:srgbClr val="505050"/>
+                </a:solidFill>
+              </a:defRPr>
+            </a:pPr>
+          </a:p>
+          <a:p>
+            <a:pPr>
+              <a:defRPr sz="1100" b="0">
+                <a:solidFill>
+                  <a:srgbClr val="505050"/>
+                </a:solidFill>
+              </a:defRPr>
+            </a:pPr>
+            <a:r>
+              <a:t>   ⚠️  Minimal code comments</a:t>
+            </a:r>
+          </a:p>
+          <a:p>
+            <a:pPr>
+              <a:defRPr sz="1100" b="0">
+                <a:solidFill>
+                  <a:srgbClr val="505050"/>
+                </a:solidFill>
+              </a:defRPr>
+            </a:pPr>
+            <a:r>
+              <a:t>   🔴 No onboarding process</a:t>
+            </a:r>
+          </a:p>
+          <a:p>
+            <a:pPr>
+              <a:defRPr sz="1100" b="0">
+                <a:solidFill>
+                  <a:srgbClr val="505050"/>
+                </a:solidFill>
+              </a:defRPr>
+            </a:pPr>
+            <a:r>
+              <a:t>   ⚠️  Significant duplication</a:t>
+            </a:r>
+          </a:p>
+          <a:p>
+            <a:pPr>
+              <a:defRPr sz="1100" b="0">
+                <a:solidFill>
+                  <a:srgbClr val="505050"/>
+                </a:solidFill>
+              </a:defRPr>
+            </a:pPr>
+            <a:r>
+              <a:t>   ⚠️  "Tentacular" dependencies</a:t>
             </a:r>
           </a:p>
         </p:txBody>
@@ -4923,14 +5389,14 @@
           <a:lstStyle/>
           <a:p>
             <a:pPr>
-              <a:defRPr sz="3600" b="1">
+              <a:defRPr sz="3200" b="1">
                 <a:solidFill>
                   <a:srgbClr val="4169E1"/>
                 </a:solidFill>
               </a:defRPr>
             </a:pPr>
             <a:r>
-              <a:t>Slide  Matching Engine Deep-Dive - "Heart of the Product"</a:t>
+              <a:t>19: Matching Engine Deep</a:t>
             </a:r>
           </a:p>
         </p:txBody>
@@ -4944,7 +5410,7 @@
         <p:spPr>
           <a:xfrm>
             <a:off x="457200" y="1005840"/>
-            <a:ext cx="11277295" cy="5486400"/>
+            <a:ext cx="11277295" cy="5394960"/>
           </a:xfrm>
           <a:prstGeom prst="rect">
             <a:avLst/>
@@ -4958,9 +5424,9 @@
           <a:lstStyle/>
           <a:p>
             <a:pPr>
-              <a:defRPr sz="1800" b="1">
-                <a:solidFill>
-                  <a:srgbClr val="000000"/>
+              <a:defRPr sz="1100" b="0">
+                <a:solidFill>
+                  <a:srgbClr val="505050"/>
                 </a:solidFill>
               </a:defRPr>
             </a:pPr>
@@ -4970,18 +5436,18 @@
           </a:p>
           <a:p>
             <a:pPr>
-              <a:defRPr sz="1400">
-                <a:solidFill>
-                  <a:srgbClr val="000000"/>
-                </a:solidFill>
-              </a:defRPr>
-            </a:pPr>
-          </a:p>
-          <a:p>
-            <a:pPr>
-              <a:defRPr sz="1800" b="1">
-                <a:solidFill>
-                  <a:srgbClr val="000000"/>
+              <a:defRPr sz="1100" b="0">
+                <a:solidFill>
+                  <a:srgbClr val="505050"/>
+                </a:solidFill>
+              </a:defRPr>
+            </a:pPr>
+          </a:p>
+          <a:p>
+            <a:pPr>
+              <a:defRPr sz="1100" b="0">
+                <a:solidFill>
+                  <a:srgbClr val="505050"/>
                 </a:solidFill>
               </a:defRPr>
             </a:pPr>
@@ -4991,9 +5457,9 @@
           </a:p>
           <a:p>
             <a:pPr>
-              <a:defRPr sz="1400">
-                <a:solidFill>
-                  <a:srgbClr val="000000"/>
+              <a:defRPr sz="1100" b="0">
+                <a:solidFill>
+                  <a:srgbClr val="505050"/>
                 </a:solidFill>
               </a:defRPr>
             </a:pPr>
@@ -5003,9 +5469,9 @@
           </a:p>
           <a:p>
             <a:pPr>
-              <a:defRPr sz="1400">
-                <a:solidFill>
-                  <a:srgbClr val="000000"/>
+              <a:defRPr sz="1100" b="0">
+                <a:solidFill>
+                  <a:srgbClr val="505050"/>
                 </a:solidFill>
               </a:defRPr>
             </a:pPr>
@@ -5015,9 +5481,9 @@
           </a:p>
           <a:p>
             <a:pPr>
-              <a:defRPr sz="1400">
-                <a:solidFill>
-                  <a:srgbClr val="000000"/>
+              <a:defRPr sz="1100" b="0">
+                <a:solidFill>
+                  <a:srgbClr val="505050"/>
                 </a:solidFill>
               </a:defRPr>
             </a:pPr>
@@ -5027,9 +5493,9 @@
           </a:p>
           <a:p>
             <a:pPr>
-              <a:defRPr sz="1400">
-                <a:solidFill>
-                  <a:srgbClr val="000000"/>
+              <a:defRPr sz="1100" b="0">
+                <a:solidFill>
+                  <a:srgbClr val="505050"/>
                 </a:solidFill>
               </a:defRPr>
             </a:pPr>
@@ -5039,9 +5505,9 @@
           </a:p>
           <a:p>
             <a:pPr>
-              <a:defRPr sz="1400">
-                <a:solidFill>
-                  <a:srgbClr val="000000"/>
+              <a:defRPr sz="1100" b="0">
+                <a:solidFill>
+                  <a:srgbClr val="505050"/>
                 </a:solidFill>
               </a:defRPr>
             </a:pPr>
@@ -5051,9 +5517,9 @@
           </a:p>
           <a:p>
             <a:pPr>
-              <a:defRPr sz="1400">
-                <a:solidFill>
-                  <a:srgbClr val="000000"/>
+              <a:defRPr sz="1100" b="0">
+                <a:solidFill>
+                  <a:srgbClr val="505050"/>
                 </a:solidFill>
               </a:defRPr>
             </a:pPr>
@@ -5063,9 +5529,9 @@
           </a:p>
           <a:p>
             <a:pPr>
-              <a:defRPr sz="1400">
-                <a:solidFill>
-                  <a:srgbClr val="000000"/>
+              <a:defRPr sz="1100" b="0">
+                <a:solidFill>
+                  <a:srgbClr val="505050"/>
                 </a:solidFill>
               </a:defRPr>
             </a:pPr>
@@ -5075,9 +5541,9 @@
           </a:p>
           <a:p>
             <a:pPr>
-              <a:defRPr sz="1400">
-                <a:solidFill>
-                  <a:srgbClr val="000000"/>
+              <a:defRPr sz="1100" b="0">
+                <a:solidFill>
+                  <a:srgbClr val="505050"/>
                 </a:solidFill>
               </a:defRPr>
             </a:pPr>
@@ -5087,9 +5553,9 @@
           </a:p>
           <a:p>
             <a:pPr>
-              <a:defRPr sz="1400">
-                <a:solidFill>
-                  <a:srgbClr val="000000"/>
+              <a:defRPr sz="1100" b="0">
+                <a:solidFill>
+                  <a:srgbClr val="505050"/>
                 </a:solidFill>
               </a:defRPr>
             </a:pPr>
@@ -5099,9 +5565,9 @@
           </a:p>
           <a:p>
             <a:pPr>
-              <a:defRPr sz="1400">
-                <a:solidFill>
-                  <a:srgbClr val="000000"/>
+              <a:defRPr sz="1100" b="0">
+                <a:solidFill>
+                  <a:srgbClr val="505050"/>
                 </a:solidFill>
               </a:defRPr>
             </a:pPr>
@@ -5111,9 +5577,9 @@
           </a:p>
           <a:p>
             <a:pPr>
-              <a:defRPr sz="1400">
-                <a:solidFill>
-                  <a:srgbClr val="000000"/>
+              <a:defRPr sz="1100" b="0">
+                <a:solidFill>
+                  <a:srgbClr val="505050"/>
                 </a:solidFill>
               </a:defRPr>
             </a:pPr>
@@ -5123,9 +5589,9 @@
           </a:p>
           <a:p>
             <a:pPr>
-              <a:defRPr sz="1400">
-                <a:solidFill>
-                  <a:srgbClr val="000000"/>
+              <a:defRPr sz="1100" b="0">
+                <a:solidFill>
+                  <a:srgbClr val="505050"/>
                 </a:solidFill>
               </a:defRPr>
             </a:pPr>
@@ -5135,9 +5601,9 @@
           </a:p>
           <a:p>
             <a:pPr>
-              <a:defRPr sz="1400">
-                <a:solidFill>
-                  <a:srgbClr val="000000"/>
+              <a:defRPr sz="1100" b="0">
+                <a:solidFill>
+                  <a:srgbClr val="505050"/>
                 </a:solidFill>
               </a:defRPr>
             </a:pPr>
@@ -5147,9 +5613,9 @@
           </a:p>
           <a:p>
             <a:pPr>
-              <a:defRPr sz="1400">
-                <a:solidFill>
-                  <a:srgbClr val="000000"/>
+              <a:defRPr sz="1100" b="0">
+                <a:solidFill>
+                  <a:srgbClr val="505050"/>
                 </a:solidFill>
               </a:defRPr>
             </a:pPr>
@@ -5159,9 +5625,9 @@
           </a:p>
           <a:p>
             <a:pPr>
-              <a:defRPr sz="1400">
-                <a:solidFill>
-                  <a:srgbClr val="000000"/>
+              <a:defRPr sz="1100" b="0">
+                <a:solidFill>
+                  <a:srgbClr val="505050"/>
                 </a:solidFill>
               </a:defRPr>
             </a:pPr>
@@ -5171,9 +5637,9 @@
           </a:p>
           <a:p>
             <a:pPr>
-              <a:defRPr sz="1400">
-                <a:solidFill>
-                  <a:srgbClr val="000000"/>
+              <a:defRPr sz="1100" b="0">
+                <a:solidFill>
+                  <a:srgbClr val="505050"/>
                 </a:solidFill>
               </a:defRPr>
             </a:pPr>
@@ -5183,9 +5649,9 @@
           </a:p>
           <a:p>
             <a:pPr>
-              <a:defRPr sz="1400">
-                <a:solidFill>
-                  <a:srgbClr val="000000"/>
+              <a:defRPr sz="1100" b="0">
+                <a:solidFill>
+                  <a:srgbClr val="505050"/>
                 </a:solidFill>
               </a:defRPr>
             </a:pPr>
@@ -5195,9 +5661,9 @@
           </a:p>
           <a:p>
             <a:pPr>
-              <a:defRPr sz="1400">
-                <a:solidFill>
-                  <a:srgbClr val="000000"/>
+              <a:defRPr sz="1100" b="0">
+                <a:solidFill>
+                  <a:srgbClr val="505050"/>
                 </a:solidFill>
               </a:defRPr>
             </a:pPr>
@@ -5207,30 +5673,30 @@
           </a:p>
           <a:p>
             <a:pPr>
-              <a:defRPr sz="1400">
-                <a:solidFill>
-                  <a:srgbClr val="000000"/>
-                </a:solidFill>
-              </a:defRPr>
-            </a:pPr>
-            <a:r>
-              <a:t>•───────────────────┘ •─────────────────────────────┘</a:t>
-            </a:r>
-          </a:p>
-          <a:p>
-            <a:pPr>
-              <a:defRPr sz="1400">
-                <a:solidFill>
-                  <a:srgbClr val="000000"/>
-                </a:solidFill>
-              </a:defRPr>
-            </a:pPr>
-          </a:p>
-          <a:p>
-            <a:pPr>
-              <a:defRPr sz="1600">
-                <a:solidFill>
-                  <a:srgbClr val="228B22"/>
+              <a:defRPr sz="1100" b="0">
+                <a:solidFill>
+                  <a:srgbClr val="505050"/>
+                </a:solidFill>
+              </a:defRPr>
+            </a:pPr>
+            <a:r>
+              <a:t>└────────────────────┘             └──────────────────────────────┘</a:t>
+            </a:r>
+          </a:p>
+          <a:p>
+            <a:pPr>
+              <a:defRPr sz="1100" b="0">
+                <a:solidFill>
+                  <a:srgbClr val="505050"/>
+                </a:solidFill>
+              </a:defRPr>
+            </a:pPr>
+          </a:p>
+          <a:p>
+            <a:pPr>
+              <a:defRPr sz="1100" b="0">
+                <a:solidFill>
+                  <a:srgbClr val="505050"/>
                 </a:solidFill>
               </a:defRPr>
             </a:pPr>
@@ -5240,203 +5706,14 @@
           </a:p>
           <a:p>
             <a:pPr>
-              <a:defRPr sz="1600">
-                <a:solidFill>
-                  <a:srgbClr val="FF8C00"/>
+              <a:defRPr sz="1100" b="0">
+                <a:solidFill>
+                  <a:srgbClr val="505050"/>
                 </a:solidFill>
               </a:defRPr>
             </a:pPr>
             <a:r>
               <a:t>⚠️  CONCERN: Synchronous blocking calls (performance coupling)</a:t>
-            </a:r>
-          </a:p>
-          <a:p>
-            <a:pPr>
-              <a:defRPr sz="1600">
-                <a:solidFill>
-                  <a:srgbClr val="DC143C"/>
-                </a:solidFill>
-              </a:defRPr>
-            </a:pPr>
-            <a:r>
-              <a:t>🔴 BLOCKER: Contractual restriction (source code inaccessible)</a:t>
-            </a:r>
-          </a:p>
-          <a:p>
-            <a:pPr>
-              <a:defRPr sz="1400">
-                <a:solidFill>
-                  <a:srgbClr val="000000"/>
-                </a:solidFill>
-              </a:defRPr>
-            </a:pPr>
-            <a:r>
-              <a:t>42+ files reviewed</a:t>
-            </a:r>
-          </a:p>
-          <a:p>
-            <a:pPr>
-              <a:defRPr sz="1400">
-                <a:solidFill>
-                  <a:srgbClr val="000000"/>
-                </a:solidFill>
-              </a:defRPr>
-            </a:pPr>
-            <a:r>
-              <a:t>┌─────────────────────────────────────────────────────┐</a:t>
-            </a:r>
-          </a:p>
-          <a:p>
-            <a:pPr>
-              <a:defRPr sz="1400">
-                <a:solidFill>
-                  <a:srgbClr val="000000"/>
-                </a:solidFill>
-              </a:defRPr>
-            </a:pPr>
-            <a:r>
-              <a:t>│ Interface Abstraction: IMatchingEngineMatchingService│</a:t>
-            </a:r>
-          </a:p>
-          <a:p>
-            <a:pPr>
-              <a:defRPr sz="1400">
-                <a:solidFill>
-                  <a:srgbClr val="000000"/>
-                </a:solidFill>
-              </a:defRPr>
-            </a:pPr>
-            <a:r>
-              <a:t>│ Implementation: MatchingEngineMatchingService.cs    │</a:t>
-            </a:r>
-          </a:p>
-          <a:p>
-            <a:pPr>
-              <a:defRPr sz="1400">
-                <a:solidFill>
-                  <a:srgbClr val="000000"/>
-                </a:solidFill>
-              </a:defRPr>
-            </a:pPr>
-            <a:r>
-              <a:t>│ Authentication: OAuth2 client credentials           │</a:t>
-            </a:r>
-          </a:p>
-          <a:p>
-            <a:pPr>
-              <a:defRPr sz="1400">
-                <a:solidFill>
-                  <a:srgbClr val="000000"/>
-                </a:solidFill>
-              </a:defRPr>
-            </a:pPr>
-            <a:r>
-              <a:t>│ HTTP Client: Factory pattern (proper DI)            │</a:t>
-            </a:r>
-          </a:p>
-          <a:p>
-            <a:pPr>
-              <a:defRPr sz="1400">
-                <a:solidFill>
-                  <a:srgbClr val="000000"/>
-                </a:solidFill>
-              </a:defRPr>
-            </a:pPr>
-            <a:r>
-              <a:t>│ Error Handling: Try-catch with logging              │</a:t>
-            </a:r>
-          </a:p>
-          <a:p>
-            <a:pPr>
-              <a:defRPr sz="1400">
-                <a:solidFill>
-                  <a:srgbClr val="000000"/>
-                </a:solidFill>
-              </a:defRPr>
-            </a:pPr>
-            <a:r>
-              <a:t>│ Timeout Configuration: Configurable                 │</a:t>
-            </a:r>
-          </a:p>
-          <a:p>
-            <a:pPr>
-              <a:defRPr sz="1400">
-                <a:solidFill>
-                  <a:srgbClr val="000000"/>
-                </a:solidFill>
-              </a:defRPr>
-            </a:pPr>
-            <a:r>
-              <a:t>•────────────────────────────────────────────────────┘</a:t>
-            </a:r>
-          </a:p>
-          <a:p>
-            <a:pPr>
-              <a:defRPr sz="1400">
-                <a:solidFill>
-                  <a:srgbClr val="000000"/>
-                </a:solidFill>
-              </a:defRPr>
-            </a:pPr>
-          </a:p>
-          <a:p>
-            <a:pPr>
-              <a:defRPr sz="1800" b="1">
-                <a:solidFill>
-                  <a:srgbClr val="000000"/>
-                </a:solidFill>
-              </a:defRPr>
-            </a:pPr>
-            <a:r>
-              <a:t>Assessment:</a:t>
-            </a:r>
-          </a:p>
-          <a:p>
-            <a:pPr>
-              <a:defRPr sz="1600">
-                <a:solidFill>
-                  <a:srgbClr val="228B22"/>
-                </a:solidFill>
-              </a:defRPr>
-            </a:pPr>
-            <a:r>
-              <a:t>✅ Professional implementation</a:t>
-            </a:r>
-          </a:p>
-          <a:p>
-            <a:pPr>
-              <a:defRPr sz="1600">
-                <a:solidFill>
-                  <a:srgbClr val="228B22"/>
-                </a:solidFill>
-              </a:defRPr>
-            </a:pPr>
-            <a:r>
-              <a:t>✅ Could be swapped for alternative (technically)</a:t>
-            </a:r>
-          </a:p>
-          <a:p>
-            <a:pPr>
-              <a:defRPr sz="1600">
-                <a:solidFill>
-                  <a:srgbClr val="FF8C00"/>
-                </a:solidFill>
-              </a:defRPr>
-            </a:pPr>
-            <a:r>
-              <a:t>⚠️  Synchronous calls = performance coupling</a:t>
-            </a:r>
-          </a:p>
-          <a:p>
-            <a:pPr>
-              <a:defRPr sz="1600">
-                <a:solidFill>
-                  <a:srgbClr val="DC143C"/>
-                </a:solidFill>
-              </a:defRPr>
-            </a:pPr>
-            <a:r>
-              <a:t>🔴 Unknown: Alternative matching engines available?</a:t>
             </a:r>
           </a:p>
         </p:txBody>
@@ -5482,14 +5759,14 @@
           <a:lstStyle/>
           <a:p>
             <a:pPr>
-              <a:defRPr sz="3600" b="1">
+              <a:defRPr sz="3200" b="1">
                 <a:solidFill>
                   <a:srgbClr val="4169E1"/>
                 </a:solidFill>
               </a:defRPr>
             </a:pPr>
             <a:r>
-              <a:t>Slide  What We Can't Access - Visibility Gaps</a:t>
+              <a:t>20: What We Can't Access</a:t>
             </a:r>
           </a:p>
         </p:txBody>
@@ -5503,7 +5780,7 @@
         <p:spPr>
           <a:xfrm>
             <a:off x="457200" y="1005840"/>
-            <a:ext cx="11277295" cy="5486400"/>
+            <a:ext cx="11277295" cy="5394960"/>
           </a:xfrm>
           <a:prstGeom prst="rect">
             <a:avLst/>
@@ -5517,9 +5794,9 @@
           <a:lstStyle/>
           <a:p>
             <a:pPr>
-              <a:defRPr sz="1800" b="1">
-                <a:solidFill>
-                  <a:srgbClr val="000000"/>
+              <a:defRPr sz="1100" b="0">
+                <a:solidFill>
+                  <a:srgbClr val="505050"/>
                 </a:solidFill>
               </a:defRPr>
             </a:pPr>
@@ -5529,18 +5806,18 @@
           </a:p>
           <a:p>
             <a:pPr>
-              <a:defRPr sz="1400">
-                <a:solidFill>
-                  <a:srgbClr val="000000"/>
-                </a:solidFill>
-              </a:defRPr>
-            </a:pPr>
-          </a:p>
-          <a:p>
-            <a:pPr>
-              <a:defRPr sz="1800" b="1">
-                <a:solidFill>
-                  <a:srgbClr val="000000"/>
+              <a:defRPr sz="1100" b="0">
+                <a:solidFill>
+                  <a:srgbClr val="505050"/>
+                </a:solidFill>
+              </a:defRPr>
+            </a:pPr>
+          </a:p>
+          <a:p>
+            <a:pPr>
+              <a:defRPr sz="1100" b="0">
+                <a:solidFill>
+                  <a:srgbClr val="505050"/>
                 </a:solidFill>
               </a:defRPr>
             </a:pPr>
@@ -5550,18 +5827,18 @@
           </a:p>
           <a:p>
             <a:pPr>
-              <a:defRPr sz="1400">
-                <a:solidFill>
-                  <a:srgbClr val="000000"/>
-                </a:solidFill>
-              </a:defRPr>
-            </a:pPr>
-          </a:p>
-          <a:p>
-            <a:pPr>
-              <a:defRPr sz="1600">
-                <a:solidFill>
-                  <a:srgbClr val="228B22"/>
+              <a:defRPr sz="1100" b="0">
+                <a:solidFill>
+                  <a:srgbClr val="505050"/>
+                </a:solidFill>
+              </a:defRPr>
+            </a:pPr>
+          </a:p>
+          <a:p>
+            <a:pPr>
+              <a:defRPr sz="1100" b="0">
+                <a:solidFill>
+                  <a:srgbClr val="505050"/>
                 </a:solidFill>
               </a:defRPr>
             </a:pPr>
@@ -5571,42 +5848,42 @@
           </a:p>
           <a:p>
             <a:pPr>
-              <a:defRPr sz="1400">
-                <a:solidFill>
-                  <a:srgbClr val="000000"/>
-                </a:solidFill>
-              </a:defRPr>
-            </a:pPr>
-            <a:r>
-              <a:t>(.NET 8)                                    code quality, integration</a:t>
-            </a:r>
-          </a:p>
-          <a:p>
-            <a:pPr>
-              <a:defRPr sz="1400">
-                <a:solidFill>
-                  <a:srgbClr val="000000"/>
-                </a:solidFill>
-              </a:defRPr>
-            </a:pPr>
-            <a:r>
-              <a:t>patterns</a:t>
-            </a:r>
-          </a:p>
-          <a:p>
-            <a:pPr>
-              <a:defRPr sz="1400">
-                <a:solidFill>
-                  <a:srgbClr val="000000"/>
-                </a:solidFill>
-              </a:defRPr>
-            </a:pPr>
-          </a:p>
-          <a:p>
-            <a:pPr>
-              <a:defRPr sz="1600">
-                <a:solidFill>
-                  <a:srgbClr val="FF8C00"/>
+              <a:defRPr sz="1100" b="0">
+                <a:solidFill>
+                  <a:srgbClr val="505050"/>
+                </a:solidFill>
+              </a:defRPr>
+            </a:pPr>
+            <a:r>
+              <a:t>   (.NET 8)                                    code quality, integration</a:t>
+            </a:r>
+          </a:p>
+          <a:p>
+            <a:pPr>
+              <a:defRPr sz="1100" b="0">
+                <a:solidFill>
+                  <a:srgbClr val="505050"/>
+                </a:solidFill>
+              </a:defRPr>
+            </a:pPr>
+            <a:r>
+              <a:t>                                               patterns</a:t>
+            </a:r>
+          </a:p>
+          <a:p>
+            <a:pPr>
+              <a:defRPr sz="1100" b="0">
+                <a:solidFill>
+                  <a:srgbClr val="505050"/>
+                </a:solidFill>
+              </a:defRPr>
+            </a:pPr>
+          </a:p>
+          <a:p>
+            <a:pPr>
+              <a:defRPr sz="1100" b="0">
+                <a:solidFill>
+                  <a:srgbClr val="505050"/>
                 </a:solidFill>
               </a:defRPr>
             </a:pPr>
@@ -5616,42 +5893,42 @@
           </a:p>
           <a:p>
             <a:pPr>
-              <a:defRPr sz="1400">
-                <a:solidFill>
-                  <a:srgbClr val="000000"/>
-                </a:solidFill>
-              </a:defRPr>
-            </a:pPr>
-            <a:r>
-              <a:t>(3+ weeks)  developer turnover, knowledge</a:t>
-            </a:r>
-          </a:p>
-          <a:p>
-            <a:pPr>
-              <a:defRPr sz="1400">
-                <a:solidFill>
-                  <a:srgbClr val="000000"/>
-                </a:solidFill>
-              </a:defRPr>
-            </a:pPr>
-            <a:r>
-              <a:t>concentration (bus factor)</a:t>
-            </a:r>
-          </a:p>
-          <a:p>
-            <a:pPr>
-              <a:defRPr sz="1400">
-                <a:solidFill>
-                  <a:srgbClr val="000000"/>
-                </a:solidFill>
-              </a:defRPr>
-            </a:pPr>
-          </a:p>
-          <a:p>
-            <a:pPr>
-              <a:defRPr sz="1600">
-                <a:solidFill>
-                  <a:srgbClr val="DC143C"/>
+              <a:defRPr sz="1100" b="0">
+                <a:solidFill>
+                  <a:srgbClr val="505050"/>
+                </a:solidFill>
+              </a:defRPr>
+            </a:pPr>
+            <a:r>
+              <a:t>                                    (3+ weeks)  developer turnover, knowledge</a:t>
+            </a:r>
+          </a:p>
+          <a:p>
+            <a:pPr>
+              <a:defRPr sz="1100" b="0">
+                <a:solidFill>
+                  <a:srgbClr val="505050"/>
+                </a:solidFill>
+              </a:defRPr>
+            </a:pPr>
+            <a:r>
+              <a:t>                                               concentration (bus factor)</a:t>
+            </a:r>
+          </a:p>
+          <a:p>
+            <a:pPr>
+              <a:defRPr sz="1100" b="0">
+                <a:solidFill>
+                  <a:srgbClr val="505050"/>
+                </a:solidFill>
+              </a:defRPr>
+            </a:pPr>
+          </a:p>
+          <a:p>
+            <a:pPr>
+              <a:defRPr sz="1100" b="0">
+                <a:solidFill>
+                  <a:srgbClr val="505050"/>
                 </a:solidFill>
               </a:defRPr>
             </a:pPr>
@@ -5661,42 +5938,42 @@
           </a:p>
           <a:p>
             <a:pPr>
-              <a:defRPr sz="1400">
-                <a:solidFill>
-                  <a:srgbClr val="000000"/>
-                </a:solidFill>
-              </a:defRPr>
-            </a:pPr>
-            <a:r>
-              <a:t>(Contract)  feasibility, build alternative,</a:t>
-            </a:r>
-          </a:p>
-          <a:p>
-            <a:pPr>
-              <a:defRPr sz="1400">
-                <a:solidFill>
-                  <a:srgbClr val="000000"/>
-                </a:solidFill>
-              </a:defRPr>
-            </a:pPr>
-            <a:r>
-              <a:t>or evaluate IP constraints</a:t>
-            </a:r>
-          </a:p>
-          <a:p>
-            <a:pPr>
-              <a:defRPr sz="1400">
-                <a:solidFill>
-                  <a:srgbClr val="000000"/>
-                </a:solidFill>
-              </a:defRPr>
-            </a:pPr>
-          </a:p>
-          <a:p>
-            <a:pPr>
-              <a:defRPr sz="1600">
-                <a:solidFill>
-                  <a:srgbClr val="DC143C"/>
+              <a:defRPr sz="1100" b="0">
+                <a:solidFill>
+                  <a:srgbClr val="505050"/>
+                </a:solidFill>
+              </a:defRPr>
+            </a:pPr>
+            <a:r>
+              <a:t>                                    (Contract)  feasibility, build alternative,</a:t>
+            </a:r>
+          </a:p>
+          <a:p>
+            <a:pPr>
+              <a:defRPr sz="1100" b="0">
+                <a:solidFill>
+                  <a:srgbClr val="505050"/>
+                </a:solidFill>
+              </a:defRPr>
+            </a:pPr>
+            <a:r>
+              <a:t>                                               or evaluate IP constraints</a:t>
+            </a:r>
+          </a:p>
+          <a:p>
+            <a:pPr>
+              <a:defRPr sz="1100" b="0">
+                <a:solidFill>
+                  <a:srgbClr val="505050"/>
+                </a:solidFill>
+              </a:defRPr>
+            </a:pPr>
+          </a:p>
+          <a:p>
+            <a:pPr>
+              <a:defRPr sz="1100" b="0">
+                <a:solidFill>
+                  <a:srgbClr val="505050"/>
                 </a:solidFill>
               </a:defRPr>
             </a:pPr>
@@ -5706,42 +5983,42 @@
           </a:p>
           <a:p>
             <a:pPr>
-              <a:defRPr sz="1400">
-                <a:solidFill>
-                  <a:srgbClr val="000000"/>
-                </a:solidFill>
-              </a:defRPr>
-            </a:pPr>
-            <a:r>
-              <a:t>(Proprietary) understand deployment process,</a:t>
-            </a:r>
-          </a:p>
-          <a:p>
-            <a:pPr>
-              <a:defRPr sz="1400">
-                <a:solidFill>
-                  <a:srgbClr val="000000"/>
-                </a:solidFill>
-              </a:defRPr>
-            </a:pPr>
-            <a:r>
-              <a:t>or enable new vendor</a:t>
-            </a:r>
-          </a:p>
-          <a:p>
-            <a:pPr>
-              <a:defRPr sz="1400">
-                <a:solidFill>
-                  <a:srgbClr val="000000"/>
-                </a:solidFill>
-              </a:defRPr>
-            </a:pPr>
-          </a:p>
-          <a:p>
-            <a:pPr>
-              <a:defRPr sz="1400">
-                <a:solidFill>
-                  <a:srgbClr val="000000"/>
+              <a:defRPr sz="1100" b="0">
+                <a:solidFill>
+                  <a:srgbClr val="505050"/>
+                </a:solidFill>
+              </a:defRPr>
+            </a:pPr>
+            <a:r>
+              <a:t>                                    (Proprietary) understand deployment process,</a:t>
+            </a:r>
+          </a:p>
+          <a:p>
+            <a:pPr>
+              <a:defRPr sz="1100" b="0">
+                <a:solidFill>
+                  <a:srgbClr val="505050"/>
+                </a:solidFill>
+              </a:defRPr>
+            </a:pPr>
+            <a:r>
+              <a:t>                                               or enable new vendor</a:t>
+            </a:r>
+          </a:p>
+          <a:p>
+            <a:pPr>
+              <a:defRPr sz="1100" b="0">
+                <a:solidFill>
+                  <a:srgbClr val="505050"/>
+                </a:solidFill>
+              </a:defRPr>
+            </a:pPr>
+          </a:p>
+          <a:p>
+            <a:pPr>
+              <a:defRPr sz="1100" b="0">
+                <a:solidFill>
+                  <a:srgbClr val="505050"/>
                 </a:solidFill>
               </a:defRPr>
             </a:pPr>
@@ -5751,311 +6028,47 @@
           </a:p>
           <a:p>
             <a:pPr>
-              <a:defRPr sz="1400">
-                <a:solidFill>
-                  <a:srgbClr val="000000"/>
-                </a:solidFill>
-              </a:defRPr>
-            </a:pPr>
-            <a:r>
-              <a:t>(CISAC auth) sprint planning, agile</a:t>
-            </a:r>
-          </a:p>
-          <a:p>
-            <a:pPr>
-              <a:defRPr sz="1400">
-                <a:solidFill>
-                  <a:srgbClr val="000000"/>
-                </a:solidFill>
-              </a:defRPr>
-            </a:pPr>
-            <a:r>
-              <a:t>maturity</a:t>
-            </a:r>
-          </a:p>
-          <a:p>
-            <a:pPr>
-              <a:defRPr sz="1400">
-                <a:solidFill>
-                  <a:srgbClr val="000000"/>
-                </a:solidFill>
-              </a:defRPr>
-            </a:pPr>
-          </a:p>
-          <a:p>
-            <a:pPr>
-              <a:defRPr sz="1400">
-                <a:solidFill>
-                  <a:srgbClr val="000000"/>
+              <a:defRPr sz="1100" b="0">
+                <a:solidFill>
+                  <a:srgbClr val="505050"/>
+                </a:solidFill>
+              </a:defRPr>
+            </a:pPr>
+            <a:r>
+              <a:t>                                    (CISAC auth) sprint planning, agile</a:t>
+            </a:r>
+          </a:p>
+          <a:p>
+            <a:pPr>
+              <a:defRPr sz="1100" b="0">
+                <a:solidFill>
+                  <a:srgbClr val="505050"/>
+                </a:solidFill>
+              </a:defRPr>
+            </a:pPr>
+            <a:r>
+              <a:t>                                               maturity</a:t>
+            </a:r>
+          </a:p>
+          <a:p>
+            <a:pPr>
+              <a:defRPr sz="1100" b="0">
+                <a:solidFill>
+                  <a:srgbClr val="505050"/>
+                </a:solidFill>
+              </a:defRPr>
+            </a:pPr>
+          </a:p>
+          <a:p>
+            <a:pPr>
+              <a:defRPr sz="1100" b="0">
+                <a:solidFill>
+                  <a:srgbClr val="505050"/>
                 </a:solidFill>
               </a:defRPr>
             </a:pPr>
             <a:r>
               <a:t>🟡 Production Performance Metrics   LIMITED    Relies on Spanish Point claims</a:t>
-            </a:r>
-          </a:p>
-          <a:p>
-            <a:pPr>
-              <a:defRPr sz="1400">
-                <a:solidFill>
-                  <a:srgbClr val="000000"/>
-                </a:solidFill>
-              </a:defRPr>
-            </a:pPr>
-            <a:r>
-              <a:t>rather than shared dashboards</a:t>
-            </a:r>
-          </a:p>
-          <a:p>
-            <a:pPr>
-              <a:defRPr sz="1400">
-                <a:solidFill>
-                  <a:srgbClr val="000000"/>
-                </a:solidFill>
-              </a:defRPr>
-            </a:pPr>
-          </a:p>
-          <a:p>
-            <a:pPr>
-              <a:defRPr sz="1400">
-                <a:solidFill>
-                  <a:srgbClr val="000000"/>
-                </a:solidFill>
-              </a:defRPr>
-            </a:pPr>
-            <a:r>
-              <a:t>🟡 Cost Correlation Data            MANUAL     No automated tooling,</a:t>
-            </a:r>
-          </a:p>
-          <a:p>
-            <a:pPr>
-              <a:defRPr sz="1400">
-                <a:solidFill>
-                  <a:srgbClr val="000000"/>
-                </a:solidFill>
-              </a:defRPr>
-            </a:pPr>
-            <a:r>
-              <a:t>support ticket required</a:t>
-            </a:r>
-          </a:p>
-          <a:p>
-            <a:pPr>
-              <a:defRPr sz="1800" b="1">
-                <a:solidFill>
-                  <a:srgbClr val="000000"/>
-                </a:solidFill>
-              </a:defRPr>
-            </a:pPr>
-            <a:r>
-              <a:t>Access Request → Question "Why?" → Multiple Objections → Reluctant Sharing</a:t>
-            </a:r>
-          </a:p>
-          <a:p>
-            <a:pPr>
-              <a:defRPr sz="1400">
-                <a:solidFill>
-                  <a:srgbClr val="000000"/>
-                </a:solidFill>
-              </a:defRPr>
-            </a:pPr>
-          </a:p>
-          <a:p>
-            <a:pPr>
-              <a:defRPr sz="1800" b="1">
-                <a:solidFill>
-                  <a:srgbClr val="000000"/>
-                </a:solidFill>
-              </a:defRPr>
-            </a:pPr>
-            <a:r>
-              <a:t>Examples:</a:t>
-            </a:r>
-          </a:p>
-          <a:p>
-            <a:pPr>
-              <a:defRPr sz="1400">
-                <a:solidFill>
-                  <a:srgbClr val="000000"/>
-                </a:solidFill>
-              </a:defRPr>
-            </a:pPr>
-            <a:r>
-              <a:t>• Code access: Legal → Technical → Proprietary → Compliance review</a:t>
-            </a:r>
-          </a:p>
-          <a:p>
-            <a:pPr>
-              <a:defRPr sz="1400">
-                <a:solidFill>
-                  <a:srgbClr val="000000"/>
-                </a:solidFill>
-              </a:defRPr>
-            </a:pPr>
-            <a:r>
-              <a:t>• Git history: "Internal working process" → Compliance review (3+ weeks)</a:t>
-            </a:r>
-          </a:p>
-          <a:p>
-            <a:pPr>
-              <a:defRPr sz="1400">
-                <a:solidFill>
-                  <a:srgbClr val="000000"/>
-                </a:solidFill>
-              </a:defRPr>
-            </a:pPr>
-            <a:r>
-              <a:t>• IaC templates: "Proprietary library" → Not included in delivery</a:t>
-            </a:r>
-          </a:p>
-          <a:p>
-            <a:pPr>
-              <a:defRPr sz="1400">
-                <a:solidFill>
-                  <a:srgbClr val="000000"/>
-                </a:solidFill>
-              </a:defRPr>
-            </a:pPr>
-            <a:r>
-              <a:t>• Cost data: No tooling → Manual investigation → Limited history</a:t>
-            </a:r>
-          </a:p>
-          <a:p>
-            <a:pPr>
-              <a:defRPr sz="1800" b="1">
-                <a:solidFill>
-                  <a:srgbClr val="000000"/>
-                </a:solidFill>
-              </a:defRPr>
-            </a:pPr>
-            <a:r>
-              <a:t>HIGH IMPACT (Vendor Independence)</a:t>
-            </a:r>
-          </a:p>
-          <a:p>
-            <a:pPr>
-              <a:defRPr sz="1400">
-                <a:solidFill>
-                  <a:srgbClr val="000000"/>
-                </a:solidFill>
-              </a:defRPr>
-            </a:pPr>
-            <a:r>
-              <a:t>• IaC Templates: Critical blocker for vendor switch</a:t>
-            </a:r>
-          </a:p>
-          <a:p>
-            <a:pPr>
-              <a:defRPr sz="1400">
-                <a:solidFill>
-                  <a:srgbClr val="000000"/>
-                </a:solidFill>
-              </a:defRPr>
-            </a:pPr>
-            <a:r>
-              <a:t>• Matching Engine: Cannot assess alternatives</a:t>
-            </a:r>
-          </a:p>
-          <a:p>
-            <a:pPr>
-              <a:defRPr sz="1400">
-                <a:solidFill>
-                  <a:srgbClr val="000000"/>
-                </a:solidFill>
-              </a:defRPr>
-            </a:pPr>
-            <a:r>
-              <a:t>• Git History: Cannot analyze evolution patterns</a:t>
-            </a:r>
-          </a:p>
-          <a:p>
-            <a:pPr>
-              <a:defRPr sz="1400">
-                <a:solidFill>
-                  <a:srgbClr val="000000"/>
-                </a:solidFill>
-              </a:defRPr>
-            </a:pPr>
-          </a:p>
-          <a:p>
-            <a:pPr>
-              <a:defRPr sz="1800" b="1">
-                <a:solidFill>
-                  <a:srgbClr val="000000"/>
-                </a:solidFill>
-              </a:defRPr>
-            </a:pPr>
-            <a:r>
-              <a:t>MEDIUM IMPACT (Operational Visibility)</a:t>
-            </a:r>
-          </a:p>
-          <a:p>
-            <a:pPr>
-              <a:defRPr sz="1400">
-                <a:solidFill>
-                  <a:srgbClr val="000000"/>
-                </a:solidFill>
-              </a:defRPr>
-            </a:pPr>
-            <a:r>
-              <a:t>• Performance Metrics: Cannot validate claims</a:t>
-            </a:r>
-          </a:p>
-          <a:p>
-            <a:pPr>
-              <a:defRPr sz="1400">
-                <a:solidFill>
-                  <a:srgbClr val="000000"/>
-                </a:solidFill>
-              </a:defRPr>
-            </a:pPr>
-            <a:r>
-              <a:t>• Cost Correlation: Cannot explain spending</a:t>
-            </a:r>
-          </a:p>
-          <a:p>
-            <a:pPr>
-              <a:defRPr sz="1400">
-                <a:solidFill>
-                  <a:srgbClr val="000000"/>
-                </a:solidFill>
-              </a:defRPr>
-            </a:pPr>
-            <a:r>
-              <a:t>• DevOps Board: Cannot assess delivery velocity</a:t>
-            </a:r>
-          </a:p>
-          <a:p>
-            <a:pPr>
-              <a:defRPr sz="1400">
-                <a:solidFill>
-                  <a:srgbClr val="000000"/>
-                </a:solidFill>
-              </a:defRPr>
-            </a:pPr>
-          </a:p>
-          <a:p>
-            <a:pPr>
-              <a:defRPr sz="1800" b="1">
-                <a:solidFill>
-                  <a:srgbClr val="000000"/>
-                </a:solidFill>
-              </a:defRPr>
-            </a:pPr>
-            <a:r>
-              <a:t>LOW IMPACT (Audit Depth)</a:t>
-            </a:r>
-          </a:p>
-          <a:p>
-            <a:pPr>
-              <a:defRPr sz="1400">
-                <a:solidFill>
-                  <a:srgbClr val="000000"/>
-                </a:solidFill>
-              </a:defRPr>
-            </a:pPr>
-            <a:r>
-              <a:t>• Limited access reduced audit depth but sufficient for strategic assessment</a:t>
             </a:r>
           </a:p>
         </p:txBody>
@@ -6101,14 +6114,14 @@
           <a:lstStyle/>
           <a:p>
             <a:pPr>
-              <a:defRPr sz="3600" b="1">
+              <a:defRPr sz="3200" b="1">
                 <a:solidFill>
                   <a:srgbClr val="4169E1"/>
                 </a:solidFill>
               </a:defRPr>
             </a:pPr>
             <a:r>
-              <a:t>Slide  Vendor Switch Effort Estimate - Preliminary Assessment</a:t>
+              <a:t>21: Vendor Switch Effort Estimate</a:t>
             </a:r>
           </a:p>
         </p:txBody>
@@ -6122,7 +6135,7 @@
         <p:spPr>
           <a:xfrm>
             <a:off x="457200" y="1005840"/>
-            <a:ext cx="11277295" cy="5486400"/>
+            <a:ext cx="11277295" cy="5394960"/>
           </a:xfrm>
           <a:prstGeom prst="rect">
             <a:avLst/>
@@ -6136,9 +6149,9 @@
           <a:lstStyle/>
           <a:p>
             <a:pPr>
-              <a:defRPr sz="1800" b="1">
-                <a:solidFill>
-                  <a:srgbClr val="000000"/>
+              <a:defRPr sz="1100" b="0">
+                <a:solidFill>
+                  <a:srgbClr val="505050"/>
                 </a:solidFill>
               </a:defRPr>
             </a:pPr>
@@ -6148,18 +6161,18 @@
           </a:p>
           <a:p>
             <a:pPr>
-              <a:defRPr sz="1400">
-                <a:solidFill>
-                  <a:srgbClr val="000000"/>
-                </a:solidFill>
-              </a:defRPr>
-            </a:pPr>
-          </a:p>
-          <a:p>
-            <a:pPr>
-              <a:defRPr sz="1800" b="1">
-                <a:solidFill>
-                  <a:srgbClr val="000000"/>
+              <a:defRPr sz="1100" b="0">
+                <a:solidFill>
+                  <a:srgbClr val="505050"/>
+                </a:solidFill>
+              </a:defRPr>
+            </a:pPr>
+          </a:p>
+          <a:p>
+            <a:pPr>
+              <a:defRPr sz="1100" b="0">
+                <a:solidFill>
+                  <a:srgbClr val="505050"/>
                 </a:solidFill>
               </a:defRPr>
             </a:pPr>
@@ -6169,18 +6182,18 @@
           </a:p>
           <a:p>
             <a:pPr>
-              <a:defRPr sz="1400">
-                <a:solidFill>
-                  <a:srgbClr val="000000"/>
-                </a:solidFill>
-              </a:defRPr>
-            </a:pPr>
-          </a:p>
-          <a:p>
-            <a:pPr>
-              <a:defRPr sz="1800" b="1">
-                <a:solidFill>
-                  <a:srgbClr val="000000"/>
+              <a:defRPr sz="1100" b="0">
+                <a:solidFill>
+                  <a:srgbClr val="505050"/>
+                </a:solidFill>
+              </a:defRPr>
+            </a:pPr>
+          </a:p>
+          <a:p>
+            <a:pPr>
+              <a:defRPr sz="1100" b="0">
+                <a:solidFill>
+                  <a:srgbClr val="505050"/>
                 </a:solidFill>
               </a:defRPr>
             </a:pPr>
@@ -6189,55 +6202,55 @@
             </a:r>
           </a:p>
           <a:p>
-            <a:pPr lvl="1">
-              <a:defRPr sz="1400">
-                <a:solidFill>
-                  <a:srgbClr val="000000"/>
-                </a:solidFill>
-              </a:defRPr>
-            </a:pPr>
-            <a:r>
-              <a:t>• Minimal documentation</a:t>
-            </a:r>
-          </a:p>
-          <a:p>
-            <a:pPr lvl="1">
-              <a:defRPr sz="1400">
-                <a:solidFill>
-                  <a:srgbClr val="000000"/>
-                </a:solidFill>
-              </a:defRPr>
-            </a:pPr>
-            <a:r>
-              <a:t>• No onboarding process</a:t>
-            </a:r>
-          </a:p>
-          <a:p>
-            <a:pPr lvl="1">
-              <a:defRPr sz="1400">
-                <a:solidFill>
-                  <a:srgbClr val="000000"/>
-                </a:solidFill>
-              </a:defRPr>
-            </a:pPr>
-            <a:r>
-              <a:t>• Recommend: Pilot test first</a:t>
-            </a:r>
-          </a:p>
-          <a:p>
-            <a:pPr>
-              <a:defRPr sz="1400">
-                <a:solidFill>
-                  <a:srgbClr val="000000"/>
-                </a:solidFill>
-              </a:defRPr>
-            </a:pPr>
-          </a:p>
-          <a:p>
-            <a:pPr>
-              <a:defRPr sz="1800" b="1">
-                <a:solidFill>
-                  <a:srgbClr val="000000"/>
+            <a:pPr>
+              <a:defRPr sz="1100" b="0">
+                <a:solidFill>
+                  <a:srgbClr val="505050"/>
+                </a:solidFill>
+              </a:defRPr>
+            </a:pPr>
+            <a:r>
+              <a:t>                                              • Minimal documentation</a:t>
+            </a:r>
+          </a:p>
+          <a:p>
+            <a:pPr>
+              <a:defRPr sz="1100" b="0">
+                <a:solidFill>
+                  <a:srgbClr val="505050"/>
+                </a:solidFill>
+              </a:defRPr>
+            </a:pPr>
+            <a:r>
+              <a:t>                                              • No onboarding process</a:t>
+            </a:r>
+          </a:p>
+          <a:p>
+            <a:pPr>
+              <a:defRPr sz="1100" b="0">
+                <a:solidFill>
+                  <a:srgbClr val="505050"/>
+                </a:solidFill>
+              </a:defRPr>
+            </a:pPr>
+            <a:r>
+              <a:t>                                              • Recommend: Pilot test first</a:t>
+            </a:r>
+          </a:p>
+          <a:p>
+            <a:pPr>
+              <a:defRPr sz="1100" b="0">
+                <a:solidFill>
+                  <a:srgbClr val="505050"/>
+                </a:solidFill>
+              </a:defRPr>
+            </a:pPr>
+          </a:p>
+          <a:p>
+            <a:pPr>
+              <a:defRPr sz="1100" b="0">
+                <a:solidFill>
+                  <a:srgbClr val="505050"/>
                 </a:solidFill>
               </a:defRPr>
             </a:pPr>
@@ -6246,43 +6259,43 @@
             </a:r>
           </a:p>
           <a:p>
-            <a:pPr lvl="1">
-              <a:defRPr sz="1400">
-                <a:solidFill>
-                  <a:srgbClr val="000000"/>
-                </a:solidFill>
-              </a:defRPr>
-            </a:pPr>
-            <a:r>
-              <a:t>• Reverse-engineer from portal</a:t>
-            </a:r>
-          </a:p>
-          <a:p>
-            <a:pPr lvl="1">
-              <a:defRPr sz="1400">
-                <a:solidFill>
-                  <a:srgbClr val="000000"/>
-                </a:solidFill>
-              </a:defRPr>
-            </a:pPr>
-            <a:r>
-              <a:t>• OR license Smart AIM library (cost unknown)</a:t>
-            </a:r>
-          </a:p>
-          <a:p>
-            <a:pPr>
-              <a:defRPr sz="1400">
-                <a:solidFill>
-                  <a:srgbClr val="000000"/>
-                </a:solidFill>
-              </a:defRPr>
-            </a:pPr>
-          </a:p>
-          <a:p>
-            <a:pPr>
-              <a:defRPr sz="1800" b="1">
-                <a:solidFill>
-                  <a:srgbClr val="000000"/>
+            <a:pPr>
+              <a:defRPr sz="1100" b="0">
+                <a:solidFill>
+                  <a:srgbClr val="505050"/>
+                </a:solidFill>
+              </a:defRPr>
+            </a:pPr>
+            <a:r>
+              <a:t>                                              • Reverse-engineer from portal</a:t>
+            </a:r>
+          </a:p>
+          <a:p>
+            <a:pPr>
+              <a:defRPr sz="1100" b="0">
+                <a:solidFill>
+                  <a:srgbClr val="505050"/>
+                </a:solidFill>
+              </a:defRPr>
+            </a:pPr>
+            <a:r>
+              <a:t>                                              • OR license Smart AIM library (cost unknown)</a:t>
+            </a:r>
+          </a:p>
+          <a:p>
+            <a:pPr>
+              <a:defRPr sz="1100" b="0">
+                <a:solidFill>
+                  <a:srgbClr val="505050"/>
+                </a:solidFill>
+              </a:defRPr>
+            </a:pPr>
+          </a:p>
+          <a:p>
+            <a:pPr>
+              <a:defRPr sz="1100" b="0">
+                <a:solidFill>
+                  <a:srgbClr val="505050"/>
                 </a:solidFill>
               </a:defRPr>
             </a:pPr>
@@ -6292,9 +6305,9 @@
           </a:p>
           <a:p>
             <a:pPr>
-              <a:defRPr sz="1800" b="1">
-                <a:solidFill>
-                  <a:srgbClr val="000000"/>
+              <a:defRPr sz="1100" b="0">
+                <a:solidFill>
+                  <a:srgbClr val="505050"/>
                 </a:solidFill>
               </a:defRPr>
             </a:pPr>
@@ -6303,31 +6316,31 @@
             </a:r>
           </a:p>
           <a:p>
-            <a:pPr lvl="1">
-              <a:defRPr sz="1400">
-                <a:solidFill>
-                  <a:srgbClr val="000000"/>
-                </a:solidFill>
-              </a:defRPr>
-            </a:pPr>
-            <a:r>
-              <a:t>• OR accept ongoing lock-in</a:t>
-            </a:r>
-          </a:p>
-          <a:p>
-            <a:pPr>
-              <a:defRPr sz="1400">
-                <a:solidFill>
-                  <a:srgbClr val="000000"/>
-                </a:solidFill>
-              </a:defRPr>
-            </a:pPr>
-          </a:p>
-          <a:p>
-            <a:pPr>
-              <a:defRPr sz="1800" b="1">
-                <a:solidFill>
-                  <a:srgbClr val="000000"/>
+            <a:pPr>
+              <a:defRPr sz="1100" b="0">
+                <a:solidFill>
+                  <a:srgbClr val="505050"/>
+                </a:solidFill>
+              </a:defRPr>
+            </a:pPr>
+            <a:r>
+              <a:t>                                              • OR accept ongoing lock-in</a:t>
+            </a:r>
+          </a:p>
+          <a:p>
+            <a:pPr>
+              <a:defRPr sz="1100" b="0">
+                <a:solidFill>
+                  <a:srgbClr val="505050"/>
+                </a:solidFill>
+              </a:defRPr>
+            </a:pPr>
+          </a:p>
+          <a:p>
+            <a:pPr>
+              <a:defRPr sz="1100" b="0">
+                <a:solidFill>
+                  <a:srgbClr val="505050"/>
                 </a:solidFill>
               </a:defRPr>
             </a:pPr>
@@ -6337,30 +6350,30 @@
           </a:p>
           <a:p>
             <a:pPr>
-              <a:defRPr sz="1400">
-                <a:solidFill>
-                  <a:srgbClr val="000000"/>
-                </a:solidFill>
-              </a:defRPr>
-            </a:pPr>
-            <a:r>
-              <a:t>(Overlap Period)           (parallel run)    • Gradual transition reduces risk</a:t>
-            </a:r>
-          </a:p>
-          <a:p>
-            <a:pPr>
-              <a:defRPr sz="1400">
-                <a:solidFill>
-                  <a:srgbClr val="000000"/>
-                </a:solidFill>
-              </a:defRPr>
-            </a:pPr>
-          </a:p>
-          <a:p>
-            <a:pPr>
-              <a:defRPr sz="1400">
-                <a:solidFill>
-                  <a:srgbClr val="000000"/>
+              <a:defRPr sz="1100" b="0">
+                <a:solidFill>
+                  <a:srgbClr val="505050"/>
+                </a:solidFill>
+              </a:defRPr>
+            </a:pPr>
+            <a:r>
+              <a:t> (Overlap Period)           (parallel run)    • Gradual transition reduces risk</a:t>
+            </a:r>
+          </a:p>
+          <a:p>
+            <a:pPr>
+              <a:defRPr sz="1100" b="0">
+                <a:solidFill>
+                  <a:srgbClr val="505050"/>
+                </a:solidFill>
+              </a:defRPr>
+            </a:pPr>
+          </a:p>
+          <a:p>
+            <a:pPr>
+              <a:defRPr sz="1100" b="0">
+                <a:solidFill>
+                  <a:srgbClr val="505050"/>
                 </a:solidFill>
               </a:defRPr>
             </a:pPr>
@@ -6370,9 +6383,9 @@
           </a:p>
           <a:p>
             <a:pPr>
-              <a:defRPr sz="1800" b="1">
-                <a:solidFill>
-                  <a:srgbClr val="000000"/>
+              <a:defRPr sz="1100" b="0">
+                <a:solidFill>
+                  <a:srgbClr val="505050"/>
                 </a:solidFill>
               </a:defRPr>
             </a:pPr>
@@ -6382,18 +6395,18 @@
           </a:p>
           <a:p>
             <a:pPr>
-              <a:defRPr sz="1400">
-                <a:solidFill>
-                  <a:srgbClr val="000000"/>
-                </a:solidFill>
-              </a:defRPr>
-            </a:pPr>
-          </a:p>
-          <a:p>
-            <a:pPr>
-              <a:defRPr sz="1800" b="1">
-                <a:solidFill>
-                  <a:srgbClr val="000000"/>
+              <a:defRPr sz="1100" b="0">
+                <a:solidFill>
+                  <a:srgbClr val="505050"/>
+                </a:solidFill>
+              </a:defRPr>
+            </a:pPr>
+          </a:p>
+          <a:p>
+            <a:pPr>
+              <a:defRPr sz="1100" b="0">
+                <a:solidFill>
+                  <a:srgbClr val="505050"/>
                 </a:solidFill>
               </a:defRPr>
             </a:pPr>
@@ -6403,347 +6416,14 @@
           </a:p>
           <a:p>
             <a:pPr>
-              <a:defRPr sz="1400">
-                <a:solidFill>
-                  <a:srgbClr val="000000"/>
-                </a:solidFill>
-              </a:defRPr>
-            </a:pPr>
-            <a:r>
-              <a:t>(educated guess, not scoped)</a:t>
-            </a:r>
-          </a:p>
-          <a:p>
-            <a:pPr>
-              <a:defRPr sz="1400">
-                <a:solidFill>
-                  <a:srgbClr val="000000"/>
-                </a:solidFill>
-              </a:defRPr>
-            </a:pPr>
-          </a:p>
-          <a:p>
-            <a:pPr>
-              <a:defRPr sz="1800" b="1">
-                <a:solidFill>
-                  <a:srgbClr val="000000"/>
-                </a:solidFill>
-              </a:defRPr>
-            </a:pPr>
-            <a:r>
-              <a:t>CRITICAL UNKNOWNS:</a:t>
-            </a:r>
-          </a:p>
-          <a:p>
-            <a:pPr>
-              <a:defRPr sz="1600">
-                <a:solidFill>
-                  <a:srgbClr val="DC143C"/>
-                </a:solidFill>
-              </a:defRPr>
-            </a:pPr>
-            <a:r>
-              <a:t>🔴 Can independent vendor maintain the code? (Knowledge transfer pilot needed)</a:t>
-            </a:r>
-          </a:p>
-          <a:p>
-            <a:pPr>
-              <a:defRPr sz="1600">
-                <a:solidFill>
-                  <a:srgbClr val="DC143C"/>
-                </a:solidFill>
-              </a:defRPr>
-            </a:pPr>
-            <a:r>
-              <a:t>🔴 Do alternative matching engines exist? (Market research needed)</a:t>
-            </a:r>
-          </a:p>
-          <a:p>
-            <a:pPr>
-              <a:defRPr sz="1600">
-                <a:solidFill>
-                  <a:srgbClr val="DC143C"/>
-                </a:solidFill>
-              </a:defRPr>
-            </a:pPr>
-            <a:r>
-              <a:t>🔴 What does Smart AIM library license cost? (Negotiate with Spanish Point)</a:t>
-            </a:r>
-          </a:p>
-          <a:p>
-            <a:pPr>
-              <a:defRPr sz="1800" b="1">
-                <a:solidFill>
-                  <a:srgbClr val="000000"/>
-                </a:solidFill>
-              </a:defRPr>
-            </a:pPr>
-            <a:r>
-              <a:t>HIGHEST RISK: Knowledge Transfer Viability</a:t>
-            </a:r>
-          </a:p>
-          <a:p>
-            <a:pPr>
-              <a:defRPr sz="1400">
-                <a:solidFill>
-                  <a:srgbClr val="000000"/>
-                </a:solidFill>
-              </a:defRPr>
-            </a:pPr>
-            <a:r>
-              <a:t>• Cannot confirm another vendor could deliver</a:t>
-            </a:r>
-          </a:p>
-          <a:p>
-            <a:pPr>
-              <a:defRPr sz="1400">
-                <a:solidFill>
-                  <a:srgbClr val="000000"/>
-                </a:solidFill>
-              </a:defRPr>
-            </a:pPr>
-            <a:r>
-              <a:t>• Minimal documentation, implicit knowledge</a:t>
-            </a:r>
-          </a:p>
-          <a:p>
-            <a:pPr>
-              <a:defRPr sz="1400">
-                <a:solidFill>
-                  <a:srgbClr val="000000"/>
-                </a:solidFill>
-              </a:defRPr>
-            </a:pPr>
-            <a:r>
-              <a:t>• MITIGATION: €10-20K pilot test (assign small feature to independent vendor)</a:t>
-            </a:r>
-          </a:p>
-          <a:p>
-            <a:pPr>
-              <a:defRPr sz="1400">
-                <a:solidFill>
-                  <a:srgbClr val="000000"/>
-                </a:solidFill>
-              </a:defRPr>
-            </a:pPr>
-          </a:p>
-          <a:p>
-            <a:pPr>
-              <a:defRPr sz="1800" b="1">
-                <a:solidFill>
-                  <a:srgbClr val="000000"/>
-                </a:solidFill>
-              </a:defRPr>
-            </a:pPr>
-            <a:r>
-              <a:t>HIGH RISK: Matching Engine Alternatives</a:t>
-            </a:r>
-          </a:p>
-          <a:p>
-            <a:pPr>
-              <a:defRPr sz="1400">
-                <a:solidFill>
-                  <a:srgbClr val="000000"/>
-                </a:solidFill>
-              </a:defRPr>
-            </a:pPr>
-            <a:r>
-              <a:t>• Market unknown, replacement feasibility uncertain</a:t>
-            </a:r>
-          </a:p>
-          <a:p>
-            <a:pPr>
-              <a:defRPr sz="1400">
-                <a:solidFill>
-                  <a:srgbClr val="000000"/>
-                </a:solidFill>
-              </a:defRPr>
-            </a:pPr>
-            <a:r>
-              <a:t>• MITIGATION: Market research, vendor RFP process</a:t>
-            </a:r>
-          </a:p>
-          <a:p>
-            <a:pPr>
-              <a:defRPr sz="1400">
-                <a:solidFill>
-                  <a:srgbClr val="000000"/>
-                </a:solidFill>
-              </a:defRPr>
-            </a:pPr>
-          </a:p>
-          <a:p>
-            <a:pPr>
-              <a:defRPr sz="1800" b="1">
-                <a:solidFill>
-                  <a:srgbClr val="000000"/>
-                </a:solidFill>
-              </a:defRPr>
-            </a:pPr>
-            <a:r>
-              <a:t>MEDIUM RISK: IaC Reconstruction</a:t>
-            </a:r>
-          </a:p>
-          <a:p>
-            <a:pPr>
-              <a:defRPr sz="1400">
-                <a:solidFill>
-                  <a:srgbClr val="000000"/>
-                </a:solidFill>
-              </a:defRPr>
-            </a:pPr>
-            <a:r>
-              <a:t>• Technically feasible but time-intensive</a:t>
-            </a:r>
-          </a:p>
-          <a:p>
-            <a:pPr>
-              <a:defRPr sz="1400">
-                <a:solidFill>
-                  <a:srgbClr val="000000"/>
-                </a:solidFill>
-              </a:defRPr>
-            </a:pPr>
-            <a:r>
-              <a:t>• MITIGATION: Negotiate IaC inclusion or Smart AIM licensing terms</a:t>
-            </a:r>
-          </a:p>
-          <a:p>
-            <a:pPr>
-              <a:defRPr sz="1400">
-                <a:solidFill>
-                  <a:srgbClr val="000000"/>
-                </a:solidFill>
-              </a:defRPr>
-            </a:pPr>
-          </a:p>
-          <a:p>
-            <a:pPr>
-              <a:defRPr sz="1800" b="1">
-                <a:solidFill>
-                  <a:srgbClr val="000000"/>
-                </a:solidFill>
-              </a:defRPr>
-            </a:pPr>
-            <a:r>
-              <a:t>MEDIUM RISK: Timeline Overruns</a:t>
-            </a:r>
-          </a:p>
-          <a:p>
-            <a:pPr>
-              <a:defRPr sz="1400">
-                <a:solidFill>
-                  <a:srgbClr val="000000"/>
-                </a:solidFill>
-              </a:defRPr>
-            </a:pPr>
-            <a:r>
-              <a:t>• 12-24 month estimate has HIGH uncertainty</a:t>
-            </a:r>
-          </a:p>
-          <a:p>
-            <a:pPr>
-              <a:defRPr sz="1400">
-                <a:solidFill>
-                  <a:srgbClr val="000000"/>
-                </a:solidFill>
-              </a:defRPr>
-            </a:pPr>
-            <a:r>
-              <a:t>• MITIGATION: Phased approach, pilot testing, parallel overlap</a:t>
-            </a:r>
-          </a:p>
-          <a:p>
-            <a:pPr>
-              <a:defRPr sz="1800" b="1">
-                <a:solidFill>
-                  <a:srgbClr val="000000"/>
-                </a:solidFill>
-              </a:defRPr>
-            </a:pPr>
-            <a:r>
-              <a:t>Option A: Vendor Switch            Option B: Improve Current Relationship</a:t>
-            </a:r>
-          </a:p>
-          <a:p>
-            <a:pPr>
-              <a:defRPr sz="1400">
-                <a:solidFill>
-                  <a:srgbClr val="000000"/>
-                </a:solidFill>
-              </a:defRPr>
-            </a:pPr>
-            <a:r>
-              <a:t>• 12-24 months timeline • Immediate (contract renegotiation)</a:t>
-            </a:r>
-          </a:p>
-          <a:p>
-            <a:pPr>
-              <a:defRPr sz="1400">
-                <a:solidFill>
-                  <a:srgbClr val="000000"/>
-                </a:solidFill>
-              </a:defRPr>
-            </a:pPr>
-            <a:r>
-              <a:t>• €300-600K cost• Minimal cost (leverage existing contract)</a:t>
-            </a:r>
-          </a:p>
-          <a:p>
-            <a:pPr>
-              <a:defRPr sz="1400">
-                <a:solidFill>
-                  <a:srgbClr val="000000"/>
-                </a:solidFill>
-              </a:defRPr>
-            </a:pPr>
-            <a:r>
-              <a:t>• HIGH risk (knowledge transfer)• MEDIUM risk (dependency continues)</a:t>
-            </a:r>
-          </a:p>
-          <a:p>
-            <a:pPr>
-              <a:defRPr sz="1400">
-                <a:solidFill>
-                  <a:srgbClr val="000000"/>
-                </a:solidFill>
-              </a:defRPr>
-            </a:pPr>
-            <a:r>
-              <a:t>• Uncertain outcome • Proven platform (already works)</a:t>
-            </a:r>
-          </a:p>
-          <a:p>
-            <a:pPr>
-              <a:defRPr sz="1400">
-                <a:solidFill>
-                  <a:srgbClr val="000000"/>
-                </a:solidFill>
-              </a:defRPr>
-            </a:pPr>
-            <a:r>
-              <a:t>• Full independence (if successful)• Better terms, more transparency</a:t>
-            </a:r>
-          </a:p>
-          <a:p>
-            <a:pPr>
-              <a:defRPr sz="1400">
-                <a:solidFill>
-                  <a:srgbClr val="000000"/>
-                </a:solidFill>
-              </a:defRPr>
-            </a:pPr>
-          </a:p>
-          <a:p>
-            <a:pPr>
-              <a:defRPr sz="1800" b="1">
-                <a:solidFill>
-                  <a:srgbClr val="000000"/>
-                </a:solidFill>
-              </a:defRPr>
-            </a:pPr>
-            <a:r>
-              <a:t>RECOMMENDATION: Test knowledge transfer BEFORE committing to switch</a:t>
+              <a:defRPr sz="1100" b="0">
+                <a:solidFill>
+                  <a:srgbClr val="505050"/>
+                </a:solidFill>
+              </a:defRPr>
+            </a:pPr>
+            <a:r>
+              <a:t>                                              (educated guess, not scoped)</a:t>
             </a:r>
           </a:p>
         </p:txBody>

</xml_diff>